<commit_message>
added lecture 13 pdf version
</commit_message>
<xml_diff>
--- a/Slide/13- What is Object-oriented Programming.pptx
+++ b/Slide/13- What is Object-oriented Programming.pptx
@@ -5,10 +5,10 @@
     <p:sldMasterId id="2147483714" r:id="rId4"/>
   </p:sldMasterIdLst>
   <p:notesMasterIdLst>
-    <p:notesMasterId r:id="rId28"/>
+    <p:notesMasterId r:id="rId29"/>
   </p:notesMasterIdLst>
   <p:handoutMasterIdLst>
-    <p:handoutMasterId r:id="rId29"/>
+    <p:handoutMasterId r:id="rId30"/>
   </p:handoutMasterIdLst>
   <p:sldIdLst>
     <p:sldId id="263" r:id="rId5"/>
@@ -29,11 +29,12 @@
     <p:sldId id="479" r:id="rId20"/>
     <p:sldId id="478" r:id="rId21"/>
     <p:sldId id="486" r:id="rId22"/>
-    <p:sldId id="487" r:id="rId23"/>
+    <p:sldId id="488" r:id="rId23"/>
     <p:sldId id="345" r:id="rId24"/>
     <p:sldId id="436" r:id="rId25"/>
     <p:sldId id="485" r:id="rId26"/>
     <p:sldId id="269" r:id="rId27"/>
+    <p:sldId id="487" r:id="rId28"/>
   </p:sldIdLst>
   <p:sldSz cx="12192000" cy="6858000"/>
   <p:notesSz cx="6858000" cy="9144000"/>
@@ -4337,15 +4338,15 @@
               <a:defRPr/>
             </a:pPr>
             <a:r>
-              <a:rPr lang="en-US" sz="1200" i="1">
+              <a:rPr lang="en-US" sz="1200" i="1" dirty="0">
                 <a:hlinkClick r:id="rId3"/>
               </a:rPr>
               <a:t>https://www.geeksforgeeks.org/python-oops-concepts/</a:t>
             </a:r>
-            <a:endParaRPr lang="en-US" sz="1200" i="1"/>
-          </a:p>
-          <a:p>
-            <a:endParaRPr lang="en-US"/>
+            <a:endParaRPr lang="en-US" sz="1200" i="1" dirty="0"/>
+          </a:p>
+          <a:p>
+            <a:endParaRPr lang="en-US" dirty="0"/>
           </a:p>
         </p:txBody>
       </p:sp>
@@ -4429,32 +4430,6 @@
           <a:bodyPr/>
           <a:lstStyle/>
           <a:p>
-            <a:pPr marL="0" marR="0" lvl="0" indent="0" algn="l" defTabSz="914400" rtl="0" eaLnBrk="1" fontAlgn="auto" latinLnBrk="0" hangingPunct="1">
-              <a:lnSpc>
-                <a:spcPct val="100000"/>
-              </a:lnSpc>
-              <a:spcBef>
-                <a:spcPts val="0"/>
-              </a:spcBef>
-              <a:spcAft>
-                <a:spcPts val="0"/>
-              </a:spcAft>
-              <a:buClrTx/>
-              <a:buSzTx/>
-              <a:buFontTx/>
-              <a:buNone/>
-              <a:tabLst/>
-              <a:defRPr/>
-            </a:pPr>
-            <a:r>
-              <a:rPr lang="en-US" sz="1200" i="1" dirty="0">
-                <a:hlinkClick r:id="rId3"/>
-              </a:rPr>
-              <a:t>https://www.geeksforgeeks.org/python-oops-concepts/</a:t>
-            </a:r>
-            <a:endParaRPr lang="en-US" sz="1200" i="1" dirty="0"/>
-          </a:p>
-          <a:p>
             <a:endParaRPr lang="en-US" dirty="0"/>
           </a:p>
         </p:txBody>
@@ -4476,7 +4451,7 @@
           <a:p>
             <a:fld id="{C051351B-2C5D-457B-ABE5-B64DBC7BD410}" type="slidenum">
               <a:rPr lang="en-US" smtClean="0"/>
-              <a:t>19</a:t>
+              <a:t>21</a:t>
             </a:fld>
             <a:endParaRPr lang="en-US" dirty="0"/>
           </a:p>
@@ -4485,7 +4460,7 @@
     </p:spTree>
     <p:extLst>
       <p:ext uri="{BB962C8B-B14F-4D97-AF65-F5344CB8AC3E}">
-        <p14:creationId xmlns:p14="http://schemas.microsoft.com/office/powerpoint/2010/main" val="1110272639"/>
+        <p14:creationId xmlns:p14="http://schemas.microsoft.com/office/powerpoint/2010/main" val="741005274"/>
       </p:ext>
     </p:extLst>
   </p:cSld>
@@ -4539,7 +4514,7 @@
           <a:bodyPr/>
           <a:lstStyle/>
           <a:p>
-            <a:endParaRPr lang="en-US" dirty="0"/>
+            <a:endParaRPr lang="en-US" u="none" dirty="0"/>
           </a:p>
         </p:txBody>
       </p:sp>
@@ -4560,7 +4535,7 @@
           <a:p>
             <a:fld id="{C051351B-2C5D-457B-ABE5-B64DBC7BD410}" type="slidenum">
               <a:rPr lang="en-US" smtClean="0"/>
-              <a:t>21</a:t>
+              <a:t>23</a:t>
             </a:fld>
             <a:endParaRPr lang="en-US" dirty="0"/>
           </a:p>
@@ -4569,7 +4544,7 @@
     </p:spTree>
     <p:extLst>
       <p:ext uri="{BB962C8B-B14F-4D97-AF65-F5344CB8AC3E}">
-        <p14:creationId xmlns:p14="http://schemas.microsoft.com/office/powerpoint/2010/main" val="741005274"/>
+        <p14:creationId xmlns:p14="http://schemas.microsoft.com/office/powerpoint/2010/main" val="540066361"/>
       </p:ext>
     </p:extLst>
   </p:cSld>
@@ -4623,7 +4598,33 @@
           <a:bodyPr/>
           <a:lstStyle/>
           <a:p>
-            <a:endParaRPr lang="en-US" u="none" dirty="0"/>
+            <a:pPr marL="0" marR="0" lvl="0" indent="0" algn="l" defTabSz="914400" rtl="0" eaLnBrk="1" fontAlgn="auto" latinLnBrk="0" hangingPunct="1">
+              <a:lnSpc>
+                <a:spcPct val="100000"/>
+              </a:lnSpc>
+              <a:spcBef>
+                <a:spcPts val="0"/>
+              </a:spcBef>
+              <a:spcAft>
+                <a:spcPts val="0"/>
+              </a:spcAft>
+              <a:buClrTx/>
+              <a:buSzTx/>
+              <a:buFontTx/>
+              <a:buNone/>
+              <a:tabLst/>
+              <a:defRPr/>
+            </a:pPr>
+            <a:r>
+              <a:rPr lang="en-US" sz="1200" i="1" dirty="0">
+                <a:hlinkClick r:id="rId3"/>
+              </a:rPr>
+              <a:t>https://www.geeksforgeeks.org/python-oops-concepts/</a:t>
+            </a:r>
+            <a:endParaRPr lang="en-US" sz="1200" i="1" dirty="0"/>
+          </a:p>
+          <a:p>
+            <a:endParaRPr lang="en-US" dirty="0"/>
           </a:p>
         </p:txBody>
       </p:sp>
@@ -4644,7 +4645,7 @@
           <a:p>
             <a:fld id="{C051351B-2C5D-457B-ABE5-B64DBC7BD410}" type="slidenum">
               <a:rPr lang="en-US" smtClean="0"/>
-              <a:t>23</a:t>
+              <a:t>24</a:t>
             </a:fld>
             <a:endParaRPr lang="en-US" dirty="0"/>
           </a:p>
@@ -4653,7 +4654,7 @@
     </p:spTree>
     <p:extLst>
       <p:ext uri="{BB962C8B-B14F-4D97-AF65-F5344CB8AC3E}">
-        <p14:creationId xmlns:p14="http://schemas.microsoft.com/office/powerpoint/2010/main" val="540066361"/>
+        <p14:creationId xmlns:p14="http://schemas.microsoft.com/office/powerpoint/2010/main" val="1110272639"/>
       </p:ext>
     </p:extLst>
   </p:cSld>
@@ -10081,10 +10082,10 @@
       </p:grpSpPr>
       <p:sp>
         <p:nvSpPr>
-          <p:cNvPr id="5" name="Title 4">
+          <p:cNvPr id="2" name="Title 1">
             <a:extLst>
               <a:ext uri="{FF2B5EF4-FFF2-40B4-BE49-F238E27FC236}">
-                <a16:creationId xmlns:a16="http://schemas.microsoft.com/office/drawing/2014/main" id="{3C5875F2-FBAE-4E42-AAE5-28E10A717CCD}"/>
+                <a16:creationId xmlns:a16="http://schemas.microsoft.com/office/drawing/2014/main" id="{F6956E82-F423-88C3-8EE5-A6558A543AD0}"/>
               </a:ext>
             </a:extLst>
           </p:cNvPr>
@@ -10102,91 +10103,46 @@
           <a:p>
             <a:r>
               <a:rPr lang="en-US" dirty="0"/>
-              <a:t>Read and implement!</a:t>
-            </a:r>
-          </a:p>
-        </p:txBody>
-      </p:sp>
-      <p:pic>
-        <p:nvPicPr>
-          <p:cNvPr id="8" name="Content Placeholder 7">
+              <a:t>Our library 😉</a:t>
+            </a:r>
+          </a:p>
+        </p:txBody>
+      </p:sp>
+      <p:sp>
+        <p:nvSpPr>
+          <p:cNvPr id="4" name="Footer Placeholder 3">
             <a:extLst>
               <a:ext uri="{FF2B5EF4-FFF2-40B4-BE49-F238E27FC236}">
-                <a16:creationId xmlns:a16="http://schemas.microsoft.com/office/drawing/2014/main" id="{152B0094-FD1D-1CE0-29A2-410698429FBF}"/>
+                <a16:creationId xmlns:a16="http://schemas.microsoft.com/office/drawing/2014/main" id="{A91950F7-D173-D5F2-9EF3-F8A8624AAA7E}"/>
               </a:ext>
             </a:extLst>
           </p:cNvPr>
-          <p:cNvPicPr>
-            <a:picLocks noGrp="1" noChangeAspect="1"/>
-          </p:cNvPicPr>
-          <p:nvPr>
-            <p:ph idx="1"/>
-          </p:nvPr>
-        </p:nvPicPr>
-        <p:blipFill>
-          <a:blip r:embed="rId3"/>
-          <a:stretch>
-            <a:fillRect/>
-          </a:stretch>
-        </p:blipFill>
-        <p:spPr>
-          <a:xfrm>
-            <a:off x="1203325" y="2098041"/>
-            <a:ext cx="9783763" cy="4033519"/>
-          </a:xfrm>
-          <a:prstGeom prst="roundRect">
-            <a:avLst>
-              <a:gd name="adj" fmla="val 8594"/>
-            </a:avLst>
-          </a:prstGeom>
-          <a:solidFill>
-            <a:srgbClr val="FFFFFF">
-              <a:shade val="85000"/>
-            </a:srgbClr>
-          </a:solidFill>
-          <a:ln>
-            <a:noFill/>
-          </a:ln>
-          <a:effectLst>
-            <a:reflection blurRad="12700" stA="38000" endPos="28000" dist="5000" dir="5400000" sy="-100000" algn="bl" rotWithShape="0"/>
-          </a:effectLst>
-        </p:spPr>
-      </p:pic>
-      <p:sp>
-        <p:nvSpPr>
-          <p:cNvPr id="3" name="Footer Placeholder 2">
+          <p:cNvSpPr>
+            <a:spLocks noGrp="1"/>
+          </p:cNvSpPr>
+          <p:nvPr>
+            <p:ph type="ftr" sz="quarter" idx="11"/>
+          </p:nvPr>
+        </p:nvSpPr>
+        <p:spPr/>
+        <p:txBody>
+          <a:bodyPr/>
+          <a:lstStyle/>
+          <a:p>
+            <a:r>
+              <a:rPr lang="en-US"/>
+              <a:t>Fundamental Programming with Python</a:t>
+            </a:r>
+            <a:endParaRPr lang="en-US" dirty="0"/>
+          </a:p>
+        </p:txBody>
+      </p:sp>
+      <p:sp>
+        <p:nvSpPr>
+          <p:cNvPr id="5" name="Slide Number Placeholder 4">
             <a:extLst>
               <a:ext uri="{FF2B5EF4-FFF2-40B4-BE49-F238E27FC236}">
-                <a16:creationId xmlns:a16="http://schemas.microsoft.com/office/drawing/2014/main" id="{49DD1556-D553-5FD3-FFAE-E7BCAE1E3CA1}"/>
-              </a:ext>
-            </a:extLst>
-          </p:cNvPr>
-          <p:cNvSpPr>
-            <a:spLocks noGrp="1"/>
-          </p:cNvSpPr>
-          <p:nvPr>
-            <p:ph type="ftr" sz="quarter" idx="11"/>
-          </p:nvPr>
-        </p:nvSpPr>
-        <p:spPr/>
-        <p:txBody>
-          <a:bodyPr/>
-          <a:lstStyle/>
-          <a:p>
-            <a:r>
-              <a:rPr lang="en-US"/>
-              <a:t>Fundamental Programming with Python</a:t>
-            </a:r>
-            <a:endParaRPr lang="en-US" dirty="0"/>
-          </a:p>
-        </p:txBody>
-      </p:sp>
-      <p:sp>
-        <p:nvSpPr>
-          <p:cNvPr id="4" name="Slide Number Placeholder 3">
-            <a:extLst>
-              <a:ext uri="{FF2B5EF4-FFF2-40B4-BE49-F238E27FC236}">
-                <a16:creationId xmlns:a16="http://schemas.microsoft.com/office/drawing/2014/main" id="{6949A135-034F-ECE1-DBE1-28E9BEBED9B9}"/>
+                <a16:creationId xmlns:a16="http://schemas.microsoft.com/office/drawing/2014/main" id="{34657C61-1A99-175A-069C-763BDA98657D}"/>
               </a:ext>
             </a:extLst>
           </p:cNvPr>
@@ -10212,20 +10168,22 @@
       </p:sp>
       <p:pic>
         <p:nvPicPr>
-          <p:cNvPr id="3074" name="Picture 2" descr="Visual Studio Code full logo transparent PNG - StickPNG">
+          <p:cNvPr id="4098" name="Picture 2">
             <a:extLst>
               <a:ext uri="{FF2B5EF4-FFF2-40B4-BE49-F238E27FC236}">
-                <a16:creationId xmlns:a16="http://schemas.microsoft.com/office/drawing/2014/main" id="{970E5F9E-3058-0B43-4F1D-F3B24439ADB9}"/>
+                <a16:creationId xmlns:a16="http://schemas.microsoft.com/office/drawing/2014/main" id="{DE60D248-C4E7-4A03-5BCB-0CAD36986350}"/>
               </a:ext>
             </a:extLst>
           </p:cNvPr>
           <p:cNvPicPr>
-            <a:picLocks noChangeAspect="1" noChangeArrowheads="1"/>
+            <a:picLocks noGrp="1" noChangeAspect="1" noChangeArrowheads="1"/>
           </p:cNvPicPr>
-          <p:nvPr/>
+          <p:nvPr>
+            <p:ph idx="1"/>
+          </p:nvPr>
         </p:nvPicPr>
         <p:blipFill>
-          <a:blip r:embed="rId4">
+          <a:blip r:embed="rId2">
             <a:extLst>
               <a:ext uri="{28A0092B-C50C-407E-A947-70E740481C1C}">
                 <a14:useLocalDpi xmlns:a14="http://schemas.microsoft.com/office/drawing/2010/main" val="0"/>
@@ -10239,8 +10197,194 @@
         </p:blipFill>
         <p:spPr bwMode="auto">
           <a:xfrm>
-            <a:off x="8595858" y="174871"/>
+            <a:off x="7739743" y="241490"/>
+            <a:ext cx="4147458" cy="6105128"/>
+          </a:xfrm>
+          <a:prstGeom prst="roundRect">
+            <a:avLst>
+              <a:gd name="adj" fmla="val 16667"/>
+            </a:avLst>
+          </a:prstGeom>
+          <a:ln>
+            <a:noFill/>
+          </a:ln>
+          <a:effectLst>
+            <a:outerShdw blurRad="76200" dist="38100" dir="7800000" algn="tl" rotWithShape="0">
+              <a:srgbClr val="000000">
+                <a:alpha val="40000"/>
+              </a:srgbClr>
+            </a:outerShdw>
+          </a:effectLst>
+          <a:scene3d>
+            <a:camera prst="orthographicFront"/>
+            <a:lightRig rig="contrasting" dir="t">
+              <a:rot lat="0" lon="0" rev="4200000"/>
+            </a:lightRig>
+          </a:scene3d>
+          <a:sp3d prstMaterial="plastic">
+            <a:bevelT w="381000" h="114300" prst="relaxedInset"/>
+            <a:contourClr>
+              <a:srgbClr val="969696"/>
+            </a:contourClr>
+          </a:sp3d>
+          <a:extLst>
+            <a:ext uri="{909E8E84-426E-40DD-AFC4-6F175D3DCCD1}">
+              <a14:hiddenFill xmlns:a14="http://schemas.microsoft.com/office/drawing/2010/main">
+                <a:solidFill>
+                  <a:srgbClr val="FFFFFF"/>
+                </a:solidFill>
+              </a14:hiddenFill>
+            </a:ext>
+          </a:extLst>
+        </p:spPr>
+      </p:pic>
+      <p:pic>
+        <p:nvPicPr>
+          <p:cNvPr id="4100" name="Picture 4">
+            <a:extLst>
+              <a:ext uri="{FF2B5EF4-FFF2-40B4-BE49-F238E27FC236}">
+                <a16:creationId xmlns:a16="http://schemas.microsoft.com/office/drawing/2014/main" id="{1FA22060-F326-0404-BA15-7DE998229857}"/>
+              </a:ext>
+            </a:extLst>
+          </p:cNvPr>
+          <p:cNvPicPr>
+            <a:picLocks noChangeAspect="1" noChangeArrowheads="1"/>
+          </p:cNvPicPr>
+          <p:nvPr/>
+        </p:nvPicPr>
+        <p:blipFill>
+          <a:blip r:embed="rId3">
+            <a:extLst>
+              <a:ext uri="{28A0092B-C50C-407E-A947-70E740481C1C}">
+                <a14:useLocalDpi xmlns:a14="http://schemas.microsoft.com/office/drawing/2010/main" val="0"/>
+              </a:ext>
+            </a:extLst>
+          </a:blip>
+          <a:srcRect/>
+          <a:stretch>
+            <a:fillRect/>
+          </a:stretch>
+        </p:blipFill>
+        <p:spPr bwMode="auto">
+          <a:xfrm>
+            <a:off x="3719094" y="1562835"/>
+            <a:ext cx="3483429" cy="5225144"/>
+          </a:xfrm>
+          <a:prstGeom prst="roundRect">
+            <a:avLst>
+              <a:gd name="adj" fmla="val 16667"/>
+            </a:avLst>
+          </a:prstGeom>
+          <a:ln>
+            <a:noFill/>
+          </a:ln>
+          <a:effectLst>
+            <a:outerShdw blurRad="76200" dist="38100" dir="7800000" algn="tl" rotWithShape="0">
+              <a:srgbClr val="000000">
+                <a:alpha val="40000"/>
+              </a:srgbClr>
+            </a:outerShdw>
+          </a:effectLst>
+          <a:scene3d>
+            <a:camera prst="orthographicFront"/>
+            <a:lightRig rig="contrasting" dir="t">
+              <a:rot lat="0" lon="0" rev="4200000"/>
+            </a:lightRig>
+          </a:scene3d>
+          <a:sp3d prstMaterial="plastic">
+            <a:bevelT w="381000" h="114300" prst="relaxedInset"/>
+            <a:contourClr>
+              <a:srgbClr val="969696"/>
+            </a:contourClr>
+          </a:sp3d>
+          <a:extLst>
+            <a:ext uri="{909E8E84-426E-40DD-AFC4-6F175D3DCCD1}">
+              <a14:hiddenFill xmlns:a14="http://schemas.microsoft.com/office/drawing/2010/main">
+                <a:solidFill>
+                  <a:srgbClr val="FFFFFF"/>
+                </a:solidFill>
+              </a14:hiddenFill>
+            </a:ext>
+          </a:extLst>
+        </p:spPr>
+      </p:pic>
+      <p:pic>
+        <p:nvPicPr>
+          <p:cNvPr id="6" name="Picture 2" descr="Visual Studio Code full logo transparent PNG - StickPNG">
+            <a:extLst>
+              <a:ext uri="{FF2B5EF4-FFF2-40B4-BE49-F238E27FC236}">
+                <a16:creationId xmlns:a16="http://schemas.microsoft.com/office/drawing/2014/main" id="{2337C37C-95E3-2A63-627B-548481E19676}"/>
+              </a:ext>
+            </a:extLst>
+          </p:cNvPr>
+          <p:cNvPicPr>
+            <a:picLocks noChangeAspect="1" noChangeArrowheads="1"/>
+          </p:cNvPicPr>
+          <p:nvPr/>
+        </p:nvPicPr>
+        <p:blipFill>
+          <a:blip r:embed="rId4">
+            <a:lum bright="70000" contrast="-70000"/>
+            <a:extLst>
+              <a:ext uri="{28A0092B-C50C-407E-A947-70E740481C1C}">
+                <a14:useLocalDpi xmlns:a14="http://schemas.microsoft.com/office/drawing/2010/main" val="0"/>
+              </a:ext>
+            </a:extLst>
+          </a:blip>
+          <a:srcRect/>
+          <a:stretch>
+            <a:fillRect/>
+          </a:stretch>
+        </p:blipFill>
+        <p:spPr bwMode="auto">
+          <a:xfrm>
+            <a:off x="10887" y="4312706"/>
             <a:ext cx="3181874" cy="1631875"/>
+          </a:xfrm>
+          <a:prstGeom prst="rect">
+            <a:avLst/>
+          </a:prstGeom>
+          <a:noFill/>
+          <a:extLst>
+            <a:ext uri="{909E8E84-426E-40DD-AFC4-6F175D3DCCD1}">
+              <a14:hiddenFill xmlns:a14="http://schemas.microsoft.com/office/drawing/2010/main">
+                <a:solidFill>
+                  <a:srgbClr val="FFFFFF"/>
+                </a:solidFill>
+              </a14:hiddenFill>
+            </a:ext>
+          </a:extLst>
+        </p:spPr>
+      </p:pic>
+      <p:pic>
+        <p:nvPicPr>
+          <p:cNvPr id="7" name="Picture 4" descr="Git Logo PNG vector in SVG, PDF, AI, CDR format">
+            <a:extLst>
+              <a:ext uri="{FF2B5EF4-FFF2-40B4-BE49-F238E27FC236}">
+                <a16:creationId xmlns:a16="http://schemas.microsoft.com/office/drawing/2014/main" id="{2273C08F-71BD-46AA-6E49-86AA207C25B6}"/>
+              </a:ext>
+            </a:extLst>
+          </p:cNvPr>
+          <p:cNvPicPr>
+            <a:picLocks noChangeAspect="1" noChangeArrowheads="1"/>
+          </p:cNvPicPr>
+          <p:nvPr/>
+        </p:nvPicPr>
+        <p:blipFill rotWithShape="1">
+          <a:blip r:embed="rId5">
+            <a:extLst>
+              <a:ext uri="{28A0092B-C50C-407E-A947-70E740481C1C}">
+                <a14:useLocalDpi xmlns:a14="http://schemas.microsoft.com/office/drawing/2010/main" val="0"/>
+              </a:ext>
+            </a:extLst>
+          </a:blip>
+          <a:srcRect l="13577" t="25563" r="10673" b="27494"/>
+          <a:stretch/>
+        </p:blipFill>
+        <p:spPr bwMode="auto">
+          <a:xfrm>
+            <a:off x="4734245" y="284176"/>
+            <a:ext cx="2721427" cy="1196729"/>
           </a:xfrm>
           <a:prstGeom prst="rect">
             <a:avLst/>
@@ -10260,7 +10404,7 @@
     </p:spTree>
     <p:extLst>
       <p:ext uri="{BB962C8B-B14F-4D97-AF65-F5344CB8AC3E}">
-        <p14:creationId xmlns:p14="http://schemas.microsoft.com/office/powerpoint/2010/main" val="744825064"/>
+        <p14:creationId xmlns:p14="http://schemas.microsoft.com/office/powerpoint/2010/main" val="1218305883"/>
       </p:ext>
     </p:extLst>
   </p:cSld>
@@ -11394,8 +11538,13 @@
           <a:p>
             <a:r>
               <a:rPr lang="en-US" dirty="0"/>
-              <a:t>About Final Exam!</a:t>
-            </a:r>
+              <a:t>About Final Exam </a:t>
+            </a:r>
+            <a:r>
+              <a:rPr lang="en-US"/>
+              <a:t>and Project!</a:t>
+            </a:r>
+            <a:endParaRPr lang="en-US" dirty="0"/>
           </a:p>
         </p:txBody>
       </p:sp>
@@ -11661,6 +11810,259 @@
 </p:sld>
 </file>
 
+<file path=ppt/slides/slide24.xml><?xml version="1.0" encoding="utf-8"?>
+<p:sld xmlns:a="http://schemas.openxmlformats.org/drawingml/2006/main" xmlns:r="http://schemas.openxmlformats.org/officeDocument/2006/relationships" xmlns:p="http://schemas.openxmlformats.org/presentationml/2006/main">
+  <p:cSld>
+    <p:spTree>
+      <p:nvGrpSpPr>
+        <p:cNvPr id="1" name=""/>
+        <p:cNvGrpSpPr/>
+        <p:nvPr/>
+      </p:nvGrpSpPr>
+      <p:grpSpPr>
+        <a:xfrm>
+          <a:off x="0" y="0"/>
+          <a:ext cx="0" cy="0"/>
+          <a:chOff x="0" y="0"/>
+          <a:chExt cx="0" cy="0"/>
+        </a:xfrm>
+      </p:grpSpPr>
+      <p:sp>
+        <p:nvSpPr>
+          <p:cNvPr id="5" name="Title 4">
+            <a:extLst>
+              <a:ext uri="{FF2B5EF4-FFF2-40B4-BE49-F238E27FC236}">
+                <a16:creationId xmlns:a16="http://schemas.microsoft.com/office/drawing/2014/main" id="{3C5875F2-FBAE-4E42-AAE5-28E10A717CCD}"/>
+              </a:ext>
+            </a:extLst>
+          </p:cNvPr>
+          <p:cNvSpPr>
+            <a:spLocks noGrp="1"/>
+          </p:cNvSpPr>
+          <p:nvPr>
+            <p:ph type="title"/>
+          </p:nvPr>
+        </p:nvSpPr>
+        <p:spPr/>
+        <p:txBody>
+          <a:bodyPr/>
+          <a:lstStyle/>
+          <a:p>
+            <a:r>
+              <a:rPr lang="en-US" dirty="0"/>
+              <a:t>For the next lecture…</a:t>
+            </a:r>
+          </a:p>
+        </p:txBody>
+      </p:sp>
+      <p:pic>
+        <p:nvPicPr>
+          <p:cNvPr id="8" name="Content Placeholder 7">
+            <a:extLst>
+              <a:ext uri="{FF2B5EF4-FFF2-40B4-BE49-F238E27FC236}">
+                <a16:creationId xmlns:a16="http://schemas.microsoft.com/office/drawing/2014/main" id="{152B0094-FD1D-1CE0-29A2-410698429FBF}"/>
+              </a:ext>
+            </a:extLst>
+          </p:cNvPr>
+          <p:cNvPicPr>
+            <a:picLocks noGrp="1" noChangeAspect="1"/>
+          </p:cNvPicPr>
+          <p:nvPr>
+            <p:ph idx="1"/>
+          </p:nvPr>
+        </p:nvPicPr>
+        <p:blipFill>
+          <a:blip r:embed="rId3"/>
+          <a:stretch>
+            <a:fillRect/>
+          </a:stretch>
+        </p:blipFill>
+        <p:spPr>
+          <a:xfrm>
+            <a:off x="1203325" y="2098041"/>
+            <a:ext cx="9783763" cy="4033519"/>
+          </a:xfrm>
+          <a:prstGeom prst="roundRect">
+            <a:avLst>
+              <a:gd name="adj" fmla="val 8594"/>
+            </a:avLst>
+          </a:prstGeom>
+          <a:solidFill>
+            <a:srgbClr val="FFFFFF">
+              <a:shade val="85000"/>
+            </a:srgbClr>
+          </a:solidFill>
+          <a:ln>
+            <a:noFill/>
+          </a:ln>
+          <a:effectLst>
+            <a:reflection blurRad="12700" stA="38000" endPos="28000" dist="5000" dir="5400000" sy="-100000" algn="bl" rotWithShape="0"/>
+          </a:effectLst>
+        </p:spPr>
+      </p:pic>
+      <p:sp>
+        <p:nvSpPr>
+          <p:cNvPr id="3" name="Footer Placeholder 2">
+            <a:extLst>
+              <a:ext uri="{FF2B5EF4-FFF2-40B4-BE49-F238E27FC236}">
+                <a16:creationId xmlns:a16="http://schemas.microsoft.com/office/drawing/2014/main" id="{49DD1556-D553-5FD3-FFAE-E7BCAE1E3CA1}"/>
+              </a:ext>
+            </a:extLst>
+          </p:cNvPr>
+          <p:cNvSpPr>
+            <a:spLocks noGrp="1"/>
+          </p:cNvSpPr>
+          <p:nvPr>
+            <p:ph type="ftr" sz="quarter" idx="11"/>
+          </p:nvPr>
+        </p:nvSpPr>
+        <p:spPr/>
+        <p:txBody>
+          <a:bodyPr/>
+          <a:lstStyle/>
+          <a:p>
+            <a:r>
+              <a:rPr lang="en-US"/>
+              <a:t>Fundamental Programming with Python</a:t>
+            </a:r>
+            <a:endParaRPr lang="en-US" dirty="0"/>
+          </a:p>
+        </p:txBody>
+      </p:sp>
+      <p:sp>
+        <p:nvSpPr>
+          <p:cNvPr id="4" name="Slide Number Placeholder 3">
+            <a:extLst>
+              <a:ext uri="{FF2B5EF4-FFF2-40B4-BE49-F238E27FC236}">
+                <a16:creationId xmlns:a16="http://schemas.microsoft.com/office/drawing/2014/main" id="{6949A135-034F-ECE1-DBE1-28E9BEBED9B9}"/>
+              </a:ext>
+            </a:extLst>
+          </p:cNvPr>
+          <p:cNvSpPr>
+            <a:spLocks noGrp="1"/>
+          </p:cNvSpPr>
+          <p:nvPr>
+            <p:ph type="sldNum" sz="quarter" idx="12"/>
+          </p:nvPr>
+        </p:nvSpPr>
+        <p:spPr/>
+        <p:txBody>
+          <a:bodyPr/>
+          <a:lstStyle/>
+          <a:p>
+            <a:fld id="{0079CAC6-A72B-4EF8-B465-34FA47827E7F}" type="slidenum">
+              <a:rPr lang="en-US" smtClean="0"/>
+              <a:t>24</a:t>
+            </a:fld>
+            <a:endParaRPr lang="en-US" dirty="0"/>
+          </a:p>
+        </p:txBody>
+      </p:sp>
+      <p:pic>
+        <p:nvPicPr>
+          <p:cNvPr id="3074" name="Picture 2" descr="Visual Studio Code full logo transparent PNG - StickPNG">
+            <a:extLst>
+              <a:ext uri="{FF2B5EF4-FFF2-40B4-BE49-F238E27FC236}">
+                <a16:creationId xmlns:a16="http://schemas.microsoft.com/office/drawing/2014/main" id="{970E5F9E-3058-0B43-4F1D-F3B24439ADB9}"/>
+              </a:ext>
+            </a:extLst>
+          </p:cNvPr>
+          <p:cNvPicPr>
+            <a:picLocks noChangeAspect="1" noChangeArrowheads="1"/>
+          </p:cNvPicPr>
+          <p:nvPr/>
+        </p:nvPicPr>
+        <p:blipFill>
+          <a:blip r:embed="rId4">
+            <a:extLst>
+              <a:ext uri="{28A0092B-C50C-407E-A947-70E740481C1C}">
+                <a14:useLocalDpi xmlns:a14="http://schemas.microsoft.com/office/drawing/2010/main" val="0"/>
+              </a:ext>
+            </a:extLst>
+          </a:blip>
+          <a:srcRect/>
+          <a:stretch>
+            <a:fillRect/>
+          </a:stretch>
+        </p:blipFill>
+        <p:spPr bwMode="auto">
+          <a:xfrm>
+            <a:off x="8595858" y="174871"/>
+            <a:ext cx="3181874" cy="1631875"/>
+          </a:xfrm>
+          <a:prstGeom prst="rect">
+            <a:avLst/>
+          </a:prstGeom>
+          <a:noFill/>
+          <a:extLst>
+            <a:ext uri="{909E8E84-426E-40DD-AFC4-6F175D3DCCD1}">
+              <a14:hiddenFill xmlns:a14="http://schemas.microsoft.com/office/drawing/2010/main">
+                <a:solidFill>
+                  <a:srgbClr val="FFFFFF"/>
+                </a:solidFill>
+              </a14:hiddenFill>
+            </a:ext>
+          </a:extLst>
+        </p:spPr>
+      </p:pic>
+      <p:pic>
+        <p:nvPicPr>
+          <p:cNvPr id="3076" name="Picture 4" descr="Git Logo PNG vector in SVG, PDF, AI, CDR format">
+            <a:extLst>
+              <a:ext uri="{FF2B5EF4-FFF2-40B4-BE49-F238E27FC236}">
+                <a16:creationId xmlns:a16="http://schemas.microsoft.com/office/drawing/2014/main" id="{F3B8F875-E7DE-AFB8-1E61-B20568BCD74F}"/>
+              </a:ext>
+            </a:extLst>
+          </p:cNvPr>
+          <p:cNvPicPr>
+            <a:picLocks noChangeAspect="1" noChangeArrowheads="1"/>
+          </p:cNvPicPr>
+          <p:nvPr/>
+        </p:nvPicPr>
+        <p:blipFill rotWithShape="1">
+          <a:blip r:embed="rId5">
+            <a:extLst>
+              <a:ext uri="{28A0092B-C50C-407E-A947-70E740481C1C}">
+                <a14:useLocalDpi xmlns:a14="http://schemas.microsoft.com/office/drawing/2010/main" val="0"/>
+              </a:ext>
+            </a:extLst>
+          </a:blip>
+          <a:srcRect l="13577" t="25563" r="10673" b="27494"/>
+          <a:stretch/>
+        </p:blipFill>
+        <p:spPr bwMode="auto">
+          <a:xfrm>
+            <a:off x="6259286" y="174871"/>
+            <a:ext cx="2721427" cy="1196729"/>
+          </a:xfrm>
+          <a:prstGeom prst="rect">
+            <a:avLst/>
+          </a:prstGeom>
+          <a:noFill/>
+          <a:extLst>
+            <a:ext uri="{909E8E84-426E-40DD-AFC4-6F175D3DCCD1}">
+              <a14:hiddenFill xmlns:a14="http://schemas.microsoft.com/office/drawing/2010/main">
+                <a:solidFill>
+                  <a:srgbClr val="FFFFFF"/>
+                </a:solidFill>
+              </a14:hiddenFill>
+            </a:ext>
+          </a:extLst>
+        </p:spPr>
+      </p:pic>
+    </p:spTree>
+    <p:extLst>
+      <p:ext uri="{BB962C8B-B14F-4D97-AF65-F5344CB8AC3E}">
+        <p14:creationId xmlns:p14="http://schemas.microsoft.com/office/powerpoint/2010/main" val="744825064"/>
+      </p:ext>
+    </p:extLst>
+  </p:cSld>
+  <p:clrMapOvr>
+    <a:masterClrMapping/>
+  </p:clrMapOvr>
+</p:sld>
+</file>
+
 <file path=ppt/slides/slide3.xml><?xml version="1.0" encoding="utf-8"?>
 <p:sld xmlns:a="http://schemas.openxmlformats.org/drawingml/2006/main" xmlns:r="http://schemas.openxmlformats.org/officeDocument/2006/relationships" xmlns:p="http://schemas.openxmlformats.org/presentationml/2006/main">
   <p:cSld>
@@ -11765,7 +12167,7 @@
           <a:p>
             <a:r>
               <a:rPr lang="en-US" dirty="0"/>
-              <a:t>About final exam!</a:t>
+              <a:t>About final exam and final project!</a:t>
             </a:r>
           </a:p>
         </p:txBody>

</xml_diff>